<commit_message>
Add the database providers for EF
</commit_message>
<xml_diff>
--- a/MeetUp16-01-2015 Entity Framework/Meetup16-1-2015.pptx
+++ b/MeetUp16-01-2015 Entity Framework/Meetup16-1-2015.pptx
@@ -259,7 +259,7 @@
           <a:p>
             <a:fld id="{57EECDCE-D2B3-42DA-89CA-3F4E490F6CDF}" type="datetimeFigureOut">
               <a:rPr lang="el-GR" smtClean="0"/>
-              <a:t>15/1/2015</a:t>
+              <a:t>16/1/2015</a:t>
             </a:fld>
             <a:endParaRPr lang="el-GR"/>
           </a:p>
@@ -429,7 +429,7 @@
           <a:p>
             <a:fld id="{57EECDCE-D2B3-42DA-89CA-3F4E490F6CDF}" type="datetimeFigureOut">
               <a:rPr lang="el-GR" smtClean="0"/>
-              <a:t>15/1/2015</a:t>
+              <a:t>16/1/2015</a:t>
             </a:fld>
             <a:endParaRPr lang="el-GR"/>
           </a:p>
@@ -609,7 +609,7 @@
           <a:p>
             <a:fld id="{57EECDCE-D2B3-42DA-89CA-3F4E490F6CDF}" type="datetimeFigureOut">
               <a:rPr lang="el-GR" smtClean="0"/>
-              <a:t>15/1/2015</a:t>
+              <a:t>16/1/2015</a:t>
             </a:fld>
             <a:endParaRPr lang="el-GR"/>
           </a:p>
@@ -779,7 +779,7 @@
           <a:p>
             <a:fld id="{57EECDCE-D2B3-42DA-89CA-3F4E490F6CDF}" type="datetimeFigureOut">
               <a:rPr lang="el-GR" smtClean="0"/>
-              <a:t>15/1/2015</a:t>
+              <a:t>16/1/2015</a:t>
             </a:fld>
             <a:endParaRPr lang="el-GR"/>
           </a:p>
@@ -1025,7 +1025,7 @@
           <a:p>
             <a:fld id="{57EECDCE-D2B3-42DA-89CA-3F4E490F6CDF}" type="datetimeFigureOut">
               <a:rPr lang="el-GR" smtClean="0"/>
-              <a:t>15/1/2015</a:t>
+              <a:t>16/1/2015</a:t>
             </a:fld>
             <a:endParaRPr lang="el-GR"/>
           </a:p>
@@ -1257,7 +1257,7 @@
           <a:p>
             <a:fld id="{57EECDCE-D2B3-42DA-89CA-3F4E490F6CDF}" type="datetimeFigureOut">
               <a:rPr lang="el-GR" smtClean="0"/>
-              <a:t>15/1/2015</a:t>
+              <a:t>16/1/2015</a:t>
             </a:fld>
             <a:endParaRPr lang="el-GR"/>
           </a:p>
@@ -1624,7 +1624,7 @@
           <a:p>
             <a:fld id="{57EECDCE-D2B3-42DA-89CA-3F4E490F6CDF}" type="datetimeFigureOut">
               <a:rPr lang="el-GR" smtClean="0"/>
-              <a:t>15/1/2015</a:t>
+              <a:t>16/1/2015</a:t>
             </a:fld>
             <a:endParaRPr lang="el-GR"/>
           </a:p>
@@ -1742,7 +1742,7 @@
           <a:p>
             <a:fld id="{57EECDCE-D2B3-42DA-89CA-3F4E490F6CDF}" type="datetimeFigureOut">
               <a:rPr lang="el-GR" smtClean="0"/>
-              <a:t>15/1/2015</a:t>
+              <a:t>16/1/2015</a:t>
             </a:fld>
             <a:endParaRPr lang="el-GR"/>
           </a:p>
@@ -1837,7 +1837,7 @@
           <a:p>
             <a:fld id="{57EECDCE-D2B3-42DA-89CA-3F4E490F6CDF}" type="datetimeFigureOut">
               <a:rPr lang="el-GR" smtClean="0"/>
-              <a:t>15/1/2015</a:t>
+              <a:t>16/1/2015</a:t>
             </a:fld>
             <a:endParaRPr lang="el-GR"/>
           </a:p>
@@ -2114,7 +2114,7 @@
           <a:p>
             <a:fld id="{57EECDCE-D2B3-42DA-89CA-3F4E490F6CDF}" type="datetimeFigureOut">
               <a:rPr lang="el-GR" smtClean="0"/>
-              <a:t>15/1/2015</a:t>
+              <a:t>16/1/2015</a:t>
             </a:fld>
             <a:endParaRPr lang="el-GR"/>
           </a:p>
@@ -2367,7 +2367,7 @@
           <a:p>
             <a:fld id="{57EECDCE-D2B3-42DA-89CA-3F4E490F6CDF}" type="datetimeFigureOut">
               <a:rPr lang="el-GR" smtClean="0"/>
-              <a:t>15/1/2015</a:t>
+              <a:t>16/1/2015</a:t>
             </a:fld>
             <a:endParaRPr lang="el-GR"/>
           </a:p>
@@ -2580,7 +2580,7 @@
           <a:p>
             <a:fld id="{57EECDCE-D2B3-42DA-89CA-3F4E490F6CDF}" type="datetimeFigureOut">
               <a:rPr lang="el-GR" smtClean="0"/>
-              <a:t>15/1/2015</a:t>
+              <a:t>16/1/2015</a:t>
             </a:fld>
             <a:endParaRPr lang="el-GR"/>
           </a:p>
@@ -3790,8 +3790,69 @@
           <a:p>
             <a:r>
               <a:rPr lang="en-US" dirty="0" smtClean="0"/>
-              <a:t>Code first as it offers a cleaner design and data access agnostic model</a:t>
-            </a:r>
+              <a:t>Code first as it offers a cleaner design and data access agnostic </a:t>
+            </a:r>
+            <a:r>
+              <a:rPr lang="en-US" dirty="0" smtClean="0"/>
+              <a:t>model</a:t>
+            </a:r>
+          </a:p>
+          <a:p>
+            <a:r>
+              <a:rPr lang="en-US" dirty="0" smtClean="0"/>
+              <a:t>Support </a:t>
+            </a:r>
+            <a:r>
+              <a:rPr lang="en-US" smtClean="0"/>
+              <a:t>the most popular databases</a:t>
+            </a:r>
+            <a:endParaRPr lang="en-US" dirty="0" smtClean="0"/>
+          </a:p>
+          <a:p>
+            <a:pPr lvl="1"/>
+            <a:r>
+              <a:rPr lang="en-US" dirty="0" smtClean="0"/>
+              <a:t>MySQL, Oracle, </a:t>
+            </a:r>
+            <a:r>
+              <a:rPr lang="en-US" dirty="0" err="1" smtClean="0"/>
+              <a:t>Devart</a:t>
+            </a:r>
+            <a:r>
+              <a:rPr lang="en-US" dirty="0"/>
+              <a:t>, </a:t>
+            </a:r>
+            <a:r>
+              <a:rPr lang="en-US" dirty="0" smtClean="0"/>
+              <a:t>PostgreSQL,</a:t>
+            </a:r>
+          </a:p>
+          <a:p>
+            <a:pPr lvl="1"/>
+            <a:r>
+              <a:rPr lang="en-US" dirty="0"/>
+              <a:t>Full list here (</a:t>
+            </a:r>
+            <a:r>
+              <a:rPr lang="en-US" dirty="0">
+                <a:hlinkClick r:id="rId3"/>
+              </a:rPr>
+              <a:t>http://msdn.microsoft.com/en-us/data/dd363565.aspx</a:t>
+            </a:r>
+            <a:r>
+              <a:rPr lang="en-US" dirty="0" smtClean="0"/>
+              <a:t>)</a:t>
+            </a:r>
+            <a:endParaRPr lang="en-US" dirty="0"/>
+          </a:p>
+          <a:p>
+            <a:pPr lvl="1"/>
+            <a:endParaRPr lang="en-US" dirty="0" smtClean="0"/>
+          </a:p>
+          <a:p>
+            <a:pPr marL="457200" lvl="1" indent="0">
+              <a:buNone/>
+            </a:pPr>
             <a:endParaRPr lang="en-US" dirty="0" smtClean="0"/>
           </a:p>
         </p:txBody>

</xml_diff>